<commit_message>
updated starting time for final presentation
</commit_message>
<xml_diff>
--- a/Lab Slides/04-Progress Update 2.pptx
+++ b/Lab Slides/04-Progress Update 2.pptx
@@ -13,14 +13,15 @@
     <p:sldId id="257" r:id="rId7"/>
     <p:sldId id="259" r:id="rId8"/>
     <p:sldId id="289" r:id="rId9"/>
-    <p:sldId id="281" r:id="rId10"/>
-    <p:sldId id="282" r:id="rId11"/>
-    <p:sldId id="287" r:id="rId12"/>
-    <p:sldId id="288" r:id="rId13"/>
-    <p:sldId id="286" r:id="rId14"/>
-    <p:sldId id="283" r:id="rId15"/>
-    <p:sldId id="284" r:id="rId16"/>
-    <p:sldId id="285" r:id="rId17"/>
+    <p:sldId id="290" r:id="rId10"/>
+    <p:sldId id="281" r:id="rId11"/>
+    <p:sldId id="282" r:id="rId12"/>
+    <p:sldId id="287" r:id="rId13"/>
+    <p:sldId id="288" r:id="rId14"/>
+    <p:sldId id="286" r:id="rId15"/>
+    <p:sldId id="283" r:id="rId16"/>
+    <p:sldId id="284" r:id="rId17"/>
+    <p:sldId id="285" r:id="rId18"/>
   </p:sldIdLst>
   <p:sldSz cx="9144000" cy="5148263"/>
   <p:notesSz cx="7559675" cy="10691813"/>
@@ -8768,27 +8769,7 @@
                 <a:latin typeface="Calibri"/>
                 <a:ea typeface="Calibri"/>
               </a:rPr>
-              <a:t>Implement and design a machine learning hierarchy wrapper for </a:t>
-            </a:r>
-            <a:r>
-              <a:rPr lang="en-US" sz="4500" b="1" strike="noStrike" spc="-1" dirty="0" err="1">
-                <a:solidFill>
-                  <a:srgbClr val="FFFFFF"/>
-                </a:solidFill>
-                <a:latin typeface="Calibri"/>
-                <a:ea typeface="Calibri"/>
-              </a:rPr>
-              <a:t>SimpleML</a:t>
-            </a:r>
-            <a:r>
-              <a:rPr lang="en-US" sz="4500" b="1" strike="noStrike" spc="-1" dirty="0">
-                <a:solidFill>
-                  <a:srgbClr val="FFFFFF"/>
-                </a:solidFill>
-                <a:latin typeface="Calibri"/>
-                <a:ea typeface="Calibri"/>
-              </a:rPr>
-              <a:t> </a:t>
+              <a:t>Interactive Data Analytics Dashboard for RDF Knowledge Graphs</a:t>
             </a:r>
           </a:p>
         </p:txBody>
@@ -8796,7 +8777,7 @@
     </p:spTree>
     <p:extLst>
       <p:ext uri="{BB962C8B-B14F-4D97-AF65-F5344CB8AC3E}">
-        <p14:creationId xmlns:p14="http://schemas.microsoft.com/office/powerpoint/2010/main" val="3140246032"/>
+        <p14:creationId xmlns:p14="http://schemas.microsoft.com/office/powerpoint/2010/main" val="3159056240"/>
       </p:ext>
     </p:extLst>
   </p:cSld>
@@ -8898,7 +8879,27 @@
                 <a:latin typeface="Calibri"/>
                 <a:ea typeface="Calibri"/>
               </a:rPr>
-              <a:t>Machine learning for Entity Matching</a:t>
+              <a:t>Implement and design a machine learning hierarchy wrapper for </a:t>
+            </a:r>
+            <a:r>
+              <a:rPr lang="en-US" sz="4500" b="1" strike="noStrike" spc="-1" dirty="0" err="1">
+                <a:solidFill>
+                  <a:srgbClr val="FFFFFF"/>
+                </a:solidFill>
+                <a:latin typeface="Calibri"/>
+                <a:ea typeface="Calibri"/>
+              </a:rPr>
+              <a:t>SimpleML</a:t>
+            </a:r>
+            <a:r>
+              <a:rPr lang="en-US" sz="4500" b="1" strike="noStrike" spc="-1" dirty="0">
+                <a:solidFill>
+                  <a:srgbClr val="FFFFFF"/>
+                </a:solidFill>
+                <a:latin typeface="Calibri"/>
+                <a:ea typeface="Calibri"/>
+              </a:rPr>
+              <a:t> </a:t>
             </a:r>
           </a:p>
         </p:txBody>
@@ -8906,7 +8907,7 @@
     </p:spTree>
     <p:extLst>
       <p:ext uri="{BB962C8B-B14F-4D97-AF65-F5344CB8AC3E}">
-        <p14:creationId xmlns:p14="http://schemas.microsoft.com/office/powerpoint/2010/main" val="264943352"/>
+        <p14:creationId xmlns:p14="http://schemas.microsoft.com/office/powerpoint/2010/main" val="3140246032"/>
       </p:ext>
     </p:extLst>
   </p:cSld>
@@ -9008,6 +9009,116 @@
                 <a:latin typeface="Calibri"/>
                 <a:ea typeface="Calibri"/>
               </a:rPr>
+              <a:t>Machine learning for Entity Matching</a:t>
+            </a:r>
+          </a:p>
+        </p:txBody>
+      </p:sp>
+    </p:spTree>
+    <p:extLst>
+      <p:ext uri="{BB962C8B-B14F-4D97-AF65-F5344CB8AC3E}">
+        <p14:creationId xmlns:p14="http://schemas.microsoft.com/office/powerpoint/2010/main" val="264943352"/>
+      </p:ext>
+    </p:extLst>
+  </p:cSld>
+  <p:clrMapOvr>
+    <a:masterClrMapping/>
+  </p:clrMapOvr>
+  <p:timing>
+    <p:tnLst>
+      <p:par>
+        <p:cTn id="1" dur="indefinite" restart="never" nodeType="tmRoot">
+          <p:childTnLst>
+            <p:seq>
+              <p:cTn id="2" dur="indefinite" nodeType="mainSeq"/>
+              <p:prevCondLst>
+                <p:cond evt="onPrev" delay="0">
+                  <p:tgtEl>
+                    <p:sldTgt/>
+                  </p:tgtEl>
+                </p:cond>
+              </p:prevCondLst>
+              <p:nextCondLst>
+                <p:cond evt="onNext" delay="0">
+                  <p:tgtEl>
+                    <p:sldTgt/>
+                  </p:tgtEl>
+                </p:cond>
+              </p:nextCondLst>
+            </p:seq>
+          </p:childTnLst>
+        </p:cTn>
+      </p:par>
+    </p:tnLst>
+  </p:timing>
+</p:sld>
+</file>
+
+<file path=ppt/slides/slide13.xml><?xml version="1.0" encoding="utf-8"?>
+<p:sld xmlns:a="http://schemas.openxmlformats.org/drawingml/2006/main" xmlns:r="http://schemas.openxmlformats.org/officeDocument/2006/relationships" xmlns:p="http://schemas.openxmlformats.org/presentationml/2006/main">
+  <p:cSld>
+    <p:spTree>
+      <p:nvGrpSpPr>
+        <p:cNvPr id="1" name=""/>
+        <p:cNvGrpSpPr/>
+        <p:nvPr/>
+      </p:nvGrpSpPr>
+      <p:grpSpPr>
+        <a:xfrm>
+          <a:off x="0" y="0"/>
+          <a:ext cx="0" cy="0"/>
+          <a:chOff x="0" y="0"/>
+          <a:chExt cx="0" cy="0"/>
+        </a:xfrm>
+      </p:grpSpPr>
+      <p:sp>
+        <p:nvSpPr>
+          <p:cNvPr id="175" name="CustomShape 1"/>
+          <p:cNvSpPr/>
+          <p:nvPr/>
+        </p:nvSpPr>
+        <p:spPr>
+          <a:xfrm>
+            <a:off x="422280" y="2271240"/>
+            <a:ext cx="7578360" cy="1944000"/>
+          </a:xfrm>
+          <a:prstGeom prst="rect">
+            <a:avLst/>
+          </a:prstGeom>
+          <a:noFill/>
+          <a:ln>
+            <a:noFill/>
+          </a:ln>
+        </p:spPr>
+        <p:style>
+          <a:lnRef idx="0">
+            <a:scrgbClr r="0" g="0" b="0"/>
+          </a:lnRef>
+          <a:fillRef idx="0">
+            <a:scrgbClr r="0" g="0" b="0"/>
+          </a:fillRef>
+          <a:effectRef idx="0">
+            <a:scrgbClr r="0" g="0" b="0"/>
+          </a:effectRef>
+          <a:fontRef idx="minor"/>
+        </p:style>
+        <p:txBody>
+          <a:bodyPr lIns="68400" tIns="68400" rIns="68400" bIns="68400"/>
+          <a:lstStyle/>
+          <a:p>
+            <a:pPr algn="r">
+              <a:lnSpc>
+                <a:spcPct val="90000"/>
+              </a:lnSpc>
+            </a:pPr>
+            <a:r>
+              <a:rPr lang="en-US" sz="4500" b="1" strike="noStrike" spc="-1" dirty="0">
+                <a:solidFill>
+                  <a:srgbClr val="FFFFFF"/>
+                </a:solidFill>
+                <a:latin typeface="Calibri"/>
+                <a:ea typeface="Calibri"/>
+              </a:rPr>
               <a:t>Distillation of DNN Networks into Gradient Boost tree model</a:t>
             </a:r>
           </a:p>
@@ -9053,7 +9164,7 @@
 </p:sld>
 </file>
 
-<file path=ppt/slides/slide13.xml><?xml version="1.0" encoding="utf-8"?>
+<file path=ppt/slides/slide14.xml><?xml version="1.0" encoding="utf-8"?>
 <p:sld xmlns:a="http://schemas.openxmlformats.org/drawingml/2006/main" xmlns:r="http://schemas.openxmlformats.org/officeDocument/2006/relationships" xmlns:p="http://schemas.openxmlformats.org/presentationml/2006/main">
   <p:cSld>
     <p:spTree>
@@ -9609,7 +9720,7 @@
                 </a:solidFill>
                 <a:latin typeface="Calibri"/>
               </a:rPr>
-              <a:t>Final presentations: February 26, 2021</a:t>
+              <a:t>Final presentations: February 26, 2021, 10am (instead of 10:15am!)</a:t>
             </a:r>
           </a:p>
           <a:p>
@@ -9690,16 +9801,7 @@
                 </a:solidFill>
                 <a:latin typeface="Calibri"/>
               </a:rPr>
-              <a:t>Please indicate during the presentation each member’s contribution to </a:t>
-            </a:r>
-            <a:r>
-              <a:rPr lang="en-US" sz="2100" spc="-1">
-                <a:solidFill>
-                  <a:srgbClr val="FF0000"/>
-                </a:solidFill>
-                <a:latin typeface="Calibri"/>
-              </a:rPr>
-              <a:t>the project.</a:t>
+              <a:t>Please indicate during the presentation each member’s contribution to the project.</a:t>
             </a:r>
             <a:endParaRPr lang="en-US" sz="2100" b="0" strike="noStrike" spc="-1" dirty="0">
               <a:solidFill>
@@ -10122,14 +10224,14 @@
       </p:grpSpPr>
       <p:sp>
         <p:nvSpPr>
-          <p:cNvPr id="175" name="CustomShape 1"/>
+          <p:cNvPr id="178" name="CustomShape 1"/>
           <p:cNvSpPr/>
           <p:nvPr/>
         </p:nvSpPr>
         <p:spPr>
           <a:xfrm>
-            <a:off x="422280" y="2271240"/>
-            <a:ext cx="7578360" cy="1944000"/>
+            <a:off x="628560" y="273960"/>
+            <a:ext cx="7886160" cy="575280"/>
           </a:xfrm>
           <a:prstGeom prst="rect">
             <a:avLst/>
@@ -10152,26 +10254,207 @@
           <a:fontRef idx="minor"/>
         </p:style>
         <p:txBody>
-          <a:bodyPr lIns="68400" tIns="68400" rIns="68400" bIns="68400"/>
-          <a:lstStyle/>
-          <a:p>
-            <a:pPr algn="r">
+          <a:bodyPr lIns="68400" tIns="68400" rIns="68400" bIns="68400" anchor="ctr"/>
+          <a:lstStyle/>
+          <a:p>
+            <a:pPr>
               <a:lnSpc>
                 <a:spcPct val="90000"/>
               </a:lnSpc>
             </a:pPr>
             <a:r>
-              <a:rPr lang="en-US" sz="4500" b="1" strike="noStrike" spc="-1" dirty="0">
+              <a:rPr lang="en-US" sz="3300" b="1" strike="noStrike" spc="-1" dirty="0">
                 <a:solidFill>
-                  <a:srgbClr val="FFFFFF"/>
+                  <a:srgbClr val="000000"/>
                 </a:solidFill>
                 <a:latin typeface="Calibri"/>
                 <a:ea typeface="Calibri"/>
               </a:rPr>
-              <a:t>Presentations</a:t>
+              <a:t>Peer </a:t>
             </a:r>
-            <a:endParaRPr lang="en-US" sz="4500" b="0" strike="noStrike" spc="-1" dirty="0">
-              <a:latin typeface="Arial"/>
+            <a:r>
+              <a:rPr lang="en-US" sz="3300" b="1" spc="-1" dirty="0">
+                <a:solidFill>
+                  <a:srgbClr val="000000"/>
+                </a:solidFill>
+                <a:latin typeface="Calibri"/>
+                <a:ea typeface="Calibri"/>
+              </a:rPr>
+              <a:t>Evaluation</a:t>
+            </a:r>
+            <a:endParaRPr lang="en-US" sz="3300" b="0" strike="noStrike" spc="-1" dirty="0">
+              <a:latin typeface="Arial"/>
+            </a:endParaRPr>
+          </a:p>
+        </p:txBody>
+      </p:sp>
+      <p:sp>
+        <p:nvSpPr>
+          <p:cNvPr id="179" name="CustomShape 2"/>
+          <p:cNvSpPr/>
+          <p:nvPr/>
+        </p:nvSpPr>
+        <p:spPr>
+          <a:xfrm>
+            <a:off x="628560" y="907560"/>
+            <a:ext cx="7886160" cy="3728520"/>
+          </a:xfrm>
+          <a:prstGeom prst="rect">
+            <a:avLst/>
+          </a:prstGeom>
+          <a:noFill/>
+          <a:ln>
+            <a:noFill/>
+          </a:ln>
+        </p:spPr>
+        <p:style>
+          <a:lnRef idx="0">
+            <a:scrgbClr r="0" g="0" b="0"/>
+          </a:lnRef>
+          <a:fillRef idx="0">
+            <a:scrgbClr r="0" g="0" b="0"/>
+          </a:fillRef>
+          <a:effectRef idx="0">
+            <a:scrgbClr r="0" g="0" b="0"/>
+          </a:effectRef>
+          <a:fontRef idx="minor"/>
+        </p:style>
+        <p:txBody>
+          <a:bodyPr lIns="68400" tIns="68400" rIns="68400" bIns="68400"/>
+          <a:lstStyle/>
+          <a:p>
+            <a:pPr marL="457200" indent="-361080">
+              <a:lnSpc>
+                <a:spcPct val="90000"/>
+              </a:lnSpc>
+              <a:spcBef>
+                <a:spcPts val="799"/>
+              </a:spcBef>
+              <a:buClr>
+                <a:srgbClr val="1F3864"/>
+              </a:buClr>
+              <a:buFont typeface="Arial"/>
+              <a:buChar char="•"/>
+            </a:pPr>
+            <a:r>
+              <a:rPr lang="en-US" sz="2100" spc="-1" dirty="0">
+                <a:latin typeface="Calibri"/>
+              </a:rPr>
+              <a:t>For the Peer Evaluation, perform the following steps:</a:t>
+            </a:r>
+          </a:p>
+          <a:p>
+            <a:pPr marL="914400" lvl="1" indent="-361080">
+              <a:lnSpc>
+                <a:spcPct val="90000"/>
+              </a:lnSpc>
+              <a:spcBef>
+                <a:spcPts val="799"/>
+              </a:spcBef>
+              <a:buClr>
+                <a:srgbClr val="1F3864"/>
+              </a:buClr>
+              <a:buFont typeface="Arial"/>
+              <a:buChar char="•"/>
+            </a:pPr>
+            <a:r>
+              <a:rPr lang="en-US" sz="2100" spc="-1" dirty="0">
+                <a:latin typeface="Calibri"/>
+              </a:rPr>
+              <a:t>Read the documentation</a:t>
+            </a:r>
+          </a:p>
+          <a:p>
+            <a:pPr marL="914400" lvl="1" indent="-361080">
+              <a:lnSpc>
+                <a:spcPct val="90000"/>
+              </a:lnSpc>
+              <a:spcBef>
+                <a:spcPts val="799"/>
+              </a:spcBef>
+              <a:buClr>
+                <a:srgbClr val="1F3864"/>
+              </a:buClr>
+              <a:buFont typeface="Arial"/>
+              <a:buChar char="•"/>
+            </a:pPr>
+            <a:r>
+              <a:rPr lang="en-US" sz="2100" spc="-1" dirty="0">
+                <a:latin typeface="Calibri"/>
+              </a:rPr>
+              <a:t>Install/setup the code</a:t>
+            </a:r>
+          </a:p>
+          <a:p>
+            <a:pPr marL="914400" lvl="1" indent="-361080">
+              <a:lnSpc>
+                <a:spcPct val="90000"/>
+              </a:lnSpc>
+              <a:spcBef>
+                <a:spcPts val="799"/>
+              </a:spcBef>
+              <a:buClr>
+                <a:srgbClr val="1F3864"/>
+              </a:buClr>
+              <a:buFont typeface="Arial"/>
+              <a:buChar char="•"/>
+            </a:pPr>
+            <a:r>
+              <a:rPr lang="en-US" sz="2100" spc="-1" dirty="0">
+                <a:latin typeface="Calibri"/>
+              </a:rPr>
+              <a:t>Run several examples/configurations</a:t>
+            </a:r>
+          </a:p>
+          <a:p>
+            <a:pPr marL="914400" lvl="1" indent="-361080">
+              <a:lnSpc>
+                <a:spcPct val="90000"/>
+              </a:lnSpc>
+              <a:spcBef>
+                <a:spcPts val="799"/>
+              </a:spcBef>
+              <a:buClr>
+                <a:srgbClr val="1F3864"/>
+              </a:buClr>
+              <a:buFont typeface="Arial"/>
+              <a:buChar char="•"/>
+            </a:pPr>
+            <a:r>
+              <a:rPr lang="en-US" sz="2100" spc="-1" dirty="0">
+                <a:latin typeface="Calibri"/>
+              </a:rPr>
+              <a:t>Report errors/problems to the group responsible for the code</a:t>
+            </a:r>
+          </a:p>
+          <a:p>
+            <a:pPr marL="914400" lvl="1" indent="-361080">
+              <a:lnSpc>
+                <a:spcPct val="90000"/>
+              </a:lnSpc>
+              <a:spcBef>
+                <a:spcPts val="799"/>
+              </a:spcBef>
+              <a:buClr>
+                <a:srgbClr val="1F3864"/>
+              </a:buClr>
+              <a:buFont typeface="Arial"/>
+              <a:buChar char="•"/>
+            </a:pPr>
+            <a:r>
+              <a:rPr lang="en-US" sz="2100" spc="-1" dirty="0">
+                <a:latin typeface="Calibri"/>
+              </a:rPr>
+              <a:t>Complete the Peer Evaluation form and </a:t>
+            </a:r>
+            <a:r>
+              <a:rPr lang="en-US" sz="2100" spc="-1">
+                <a:latin typeface="Calibri"/>
+              </a:rPr>
+              <a:t>submit it on time</a:t>
+            </a:r>
+            <a:endParaRPr lang="en-US" sz="2100" spc="-1" dirty="0">
+              <a:latin typeface="Calibri"/>
             </a:endParaRPr>
           </a:p>
         </p:txBody>
@@ -10179,7 +10462,7 @@
     </p:spTree>
     <p:extLst>
       <p:ext uri="{BB962C8B-B14F-4D97-AF65-F5344CB8AC3E}">
-        <p14:creationId xmlns:p14="http://schemas.microsoft.com/office/powerpoint/2010/main" val="4107614018"/>
+        <p14:creationId xmlns:p14="http://schemas.microsoft.com/office/powerpoint/2010/main" val="2801530040"/>
       </p:ext>
     </p:extLst>
   </p:cSld>
@@ -10235,14 +10518,14 @@
       </p:grpSpPr>
       <p:sp>
         <p:nvSpPr>
-          <p:cNvPr id="178" name="CustomShape 1"/>
+          <p:cNvPr id="175" name="CustomShape 1"/>
           <p:cNvSpPr/>
           <p:nvPr/>
         </p:nvSpPr>
         <p:spPr>
           <a:xfrm>
-            <a:off x="628560" y="273960"/>
-            <a:ext cx="7886160" cy="575280"/>
+            <a:off x="422280" y="2271240"/>
+            <a:ext cx="7578360" cy="1944000"/>
           </a:xfrm>
           <a:prstGeom prst="rect">
             <a:avLst/>
@@ -10265,357 +10548,25 @@
           <a:fontRef idx="minor"/>
         </p:style>
         <p:txBody>
-          <a:bodyPr lIns="68400" tIns="68400" rIns="68400" bIns="68400" anchor="ctr"/>
-          <a:lstStyle/>
-          <a:p>
-            <a:pPr>
+          <a:bodyPr lIns="68400" tIns="68400" rIns="68400" bIns="68400"/>
+          <a:lstStyle/>
+          <a:p>
+            <a:pPr algn="r">
               <a:lnSpc>
                 <a:spcPct val="90000"/>
               </a:lnSpc>
             </a:pPr>
             <a:r>
-              <a:rPr lang="en-US" sz="3300" b="1" strike="noStrike" spc="-1" dirty="0">
+              <a:rPr lang="en-US" sz="4500" b="1" strike="noStrike" spc="-1" dirty="0">
                 <a:solidFill>
-                  <a:srgbClr val="000000"/>
+                  <a:srgbClr val="FFFFFF"/>
                 </a:solidFill>
                 <a:latin typeface="Calibri"/>
                 <a:ea typeface="Calibri"/>
               </a:rPr>
               <a:t>Presentations</a:t>
             </a:r>
-            <a:endParaRPr lang="en-US" sz="3300" b="0" strike="noStrike" spc="-1" dirty="0">
-              <a:latin typeface="Arial"/>
-            </a:endParaRPr>
-          </a:p>
-        </p:txBody>
-      </p:sp>
-      <p:sp>
-        <p:nvSpPr>
-          <p:cNvPr id="179" name="CustomShape 2"/>
-          <p:cNvSpPr/>
-          <p:nvPr/>
-        </p:nvSpPr>
-        <p:spPr>
-          <a:xfrm>
-            <a:off x="628560" y="907560"/>
-            <a:ext cx="7886160" cy="3728520"/>
-          </a:xfrm>
-          <a:prstGeom prst="rect">
-            <a:avLst/>
-          </a:prstGeom>
-          <a:noFill/>
-          <a:ln>
-            <a:noFill/>
-          </a:ln>
-        </p:spPr>
-        <p:style>
-          <a:lnRef idx="0">
-            <a:scrgbClr r="0" g="0" b="0"/>
-          </a:lnRef>
-          <a:fillRef idx="0">
-            <a:scrgbClr r="0" g="0" b="0"/>
-          </a:fillRef>
-          <a:effectRef idx="0">
-            <a:scrgbClr r="0" g="0" b="0"/>
-          </a:effectRef>
-          <a:fontRef idx="minor"/>
-        </p:style>
-        <p:txBody>
-          <a:bodyPr lIns="68400" tIns="68400" rIns="68400" bIns="68400"/>
-          <a:lstStyle/>
-          <a:p>
-            <a:pPr marL="457200" indent="-361080">
-              <a:lnSpc>
-                <a:spcPct val="90000"/>
-              </a:lnSpc>
-              <a:spcBef>
-                <a:spcPts val="799"/>
-              </a:spcBef>
-              <a:buClr>
-                <a:srgbClr val="1F3864"/>
-              </a:buClr>
-              <a:buFont typeface="Arial"/>
-              <a:buChar char="•"/>
-            </a:pPr>
-            <a:r>
-              <a:rPr lang="en-US" sz="2100" b="0" strike="noStrike" spc="-1" dirty="0">
-                <a:solidFill>
-                  <a:srgbClr val="000000"/>
-                </a:solidFill>
-                <a:latin typeface="Calibri"/>
-                <a:ea typeface="Calibri"/>
-              </a:rPr>
-              <a:t>Reminder: your presentation shouldn’t be longer than 5 minutes.</a:t>
-            </a:r>
-          </a:p>
-          <a:p>
-            <a:pPr marL="457200" indent="-361080">
-              <a:lnSpc>
-                <a:spcPct val="90000"/>
-              </a:lnSpc>
-              <a:spcBef>
-                <a:spcPts val="799"/>
-              </a:spcBef>
-              <a:buClr>
-                <a:srgbClr val="1F3864"/>
-              </a:buClr>
-              <a:buFont typeface="Arial"/>
-              <a:buChar char="•"/>
-            </a:pPr>
-            <a:r>
-              <a:rPr lang="en-US" sz="2100" spc="-1" dirty="0">
-                <a:solidFill>
-                  <a:srgbClr val="000000"/>
-                </a:solidFill>
-                <a:latin typeface="Calibri"/>
-              </a:rPr>
-              <a:t>After 10 minutes, I have to interrupt your presentation.</a:t>
-            </a:r>
-          </a:p>
-          <a:p>
-            <a:pPr marL="457200" indent="-361080">
-              <a:lnSpc>
-                <a:spcPct val="90000"/>
-              </a:lnSpc>
-              <a:spcBef>
-                <a:spcPts val="799"/>
-              </a:spcBef>
-              <a:buClr>
-                <a:srgbClr val="1F3864"/>
-              </a:buClr>
-              <a:buFont typeface="Arial"/>
-              <a:buChar char="•"/>
-            </a:pPr>
-            <a:r>
-              <a:rPr lang="en-US" sz="2100" b="0" strike="noStrike" spc="-1" dirty="0">
-                <a:solidFill>
-                  <a:srgbClr val="000000"/>
-                </a:solidFill>
-                <a:latin typeface="Calibri"/>
-              </a:rPr>
-              <a:t>We will have the pres</a:t>
-            </a:r>
-            <a:r>
-              <a:rPr lang="en-US" sz="2100" spc="-1" dirty="0">
-                <a:solidFill>
-                  <a:srgbClr val="000000"/>
-                </a:solidFill>
-                <a:latin typeface="Calibri"/>
-              </a:rPr>
-              <a:t>entations in the following order:</a:t>
-            </a:r>
-          </a:p>
-          <a:p>
-            <a:pPr marL="914400" lvl="1" indent="-361080">
-              <a:lnSpc>
-                <a:spcPct val="90000"/>
-              </a:lnSpc>
-              <a:spcBef>
-                <a:spcPts val="799"/>
-              </a:spcBef>
-              <a:buClr>
-                <a:srgbClr val="1F3864"/>
-              </a:buClr>
-              <a:buFont typeface="Arial"/>
-              <a:buChar char="•"/>
-            </a:pPr>
-            <a:r>
-              <a:rPr lang="en-US" b="0" strike="noStrike" spc="-1" dirty="0">
-                <a:latin typeface="Calibri" panose="020F0502020204030204" pitchFamily="34" charset="0"/>
-                <a:cs typeface="Calibri" panose="020F0502020204030204" pitchFamily="34" charset="0"/>
-              </a:rPr>
-              <a:t>Example Based explanations of a trained ML-model for RDF and Tabular data</a:t>
-            </a:r>
-            <a:endParaRPr lang="en-US" b="0" strike="noStrike" spc="-1" dirty="0">
-              <a:solidFill>
-                <a:srgbClr val="000000"/>
-              </a:solidFill>
-              <a:latin typeface="Calibri" panose="020F0502020204030204" pitchFamily="34" charset="0"/>
-              <a:cs typeface="Calibri" panose="020F0502020204030204" pitchFamily="34" charset="0"/>
-            </a:endParaRPr>
-          </a:p>
-          <a:p>
-            <a:pPr marL="914400" lvl="1" indent="-361080">
-              <a:lnSpc>
-                <a:spcPct val="90000"/>
-              </a:lnSpc>
-              <a:spcBef>
-                <a:spcPts val="799"/>
-              </a:spcBef>
-              <a:buClr>
-                <a:srgbClr val="1F3864"/>
-              </a:buClr>
-              <a:buFont typeface="Arial"/>
-              <a:buChar char="•"/>
-            </a:pPr>
-            <a:r>
-              <a:rPr lang="en-US" b="0" strike="noStrike" spc="-1" dirty="0">
-                <a:solidFill>
-                  <a:srgbClr val="000000"/>
-                </a:solidFill>
-                <a:latin typeface="Calibri" panose="020F0502020204030204" pitchFamily="34" charset="0"/>
-                <a:cs typeface="Calibri" panose="020F0502020204030204" pitchFamily="34" charset="0"/>
-              </a:rPr>
-              <a:t>Interactive Data Analytics Dashboard for RDF Knowledge Graphs</a:t>
-            </a:r>
-            <a:endParaRPr lang="en-US" b="0" strike="noStrike" spc="-1" dirty="0">
-              <a:latin typeface="Calibri" panose="020F0502020204030204" pitchFamily="34" charset="0"/>
-              <a:cs typeface="Calibri" panose="020F0502020204030204" pitchFamily="34" charset="0"/>
-            </a:endParaRPr>
-          </a:p>
-          <a:p>
-            <a:pPr marL="914400" lvl="1" indent="-361080">
-              <a:lnSpc>
-                <a:spcPct val="90000"/>
-              </a:lnSpc>
-              <a:spcBef>
-                <a:spcPts val="799"/>
-              </a:spcBef>
-              <a:buClr>
-                <a:srgbClr val="1F3864"/>
-              </a:buClr>
-              <a:buFont typeface="Arial"/>
-              <a:buChar char="•"/>
-            </a:pPr>
-            <a:r>
-              <a:rPr lang="en-US" b="0" strike="noStrike" spc="-1" dirty="0">
-                <a:latin typeface="Calibri" panose="020F0502020204030204" pitchFamily="34" charset="0"/>
-                <a:cs typeface="Calibri" panose="020F0502020204030204" pitchFamily="34" charset="0"/>
-              </a:rPr>
-              <a:t>Implement and design a machine learning hierarchy wrapper for </a:t>
-            </a:r>
-            <a:r>
-              <a:rPr lang="en-US" b="0" strike="noStrike" spc="-1" dirty="0" err="1">
-                <a:latin typeface="Calibri" panose="020F0502020204030204" pitchFamily="34" charset="0"/>
-                <a:cs typeface="Calibri" panose="020F0502020204030204" pitchFamily="34" charset="0"/>
-              </a:rPr>
-              <a:t>SimpleML</a:t>
-            </a:r>
-            <a:r>
-              <a:rPr lang="en-US" b="0" strike="noStrike" spc="-1" dirty="0">
-                <a:latin typeface="Calibri" panose="020F0502020204030204" pitchFamily="34" charset="0"/>
-                <a:cs typeface="Calibri" panose="020F0502020204030204" pitchFamily="34" charset="0"/>
-              </a:rPr>
-              <a:t> </a:t>
-            </a:r>
-          </a:p>
-          <a:p>
-            <a:pPr marL="914400" lvl="1" indent="-361080">
-              <a:lnSpc>
-                <a:spcPct val="90000"/>
-              </a:lnSpc>
-              <a:spcBef>
-                <a:spcPts val="799"/>
-              </a:spcBef>
-              <a:buClr>
-                <a:srgbClr val="1F3864"/>
-              </a:buClr>
-              <a:buFont typeface="Arial"/>
-              <a:buChar char="•"/>
-            </a:pPr>
-            <a:r>
-              <a:rPr lang="en-US" b="0" strike="noStrike" spc="-1" dirty="0">
-                <a:latin typeface="Calibri" panose="020F0502020204030204" pitchFamily="34" charset="0"/>
-                <a:cs typeface="Calibri" panose="020F0502020204030204" pitchFamily="34" charset="0"/>
-              </a:rPr>
-              <a:t>Machine learning for Entity Matching</a:t>
-            </a:r>
-            <a:endParaRPr lang="en-US" spc="-1" dirty="0">
-              <a:solidFill>
-                <a:srgbClr val="000000"/>
-              </a:solidFill>
-              <a:latin typeface="Calibri" panose="020F0502020204030204" pitchFamily="34" charset="0"/>
-              <a:cs typeface="Calibri" panose="020F0502020204030204" pitchFamily="34" charset="0"/>
-            </a:endParaRPr>
-          </a:p>
-          <a:p>
-            <a:pPr marL="914400" lvl="1" indent="-361080">
-              <a:lnSpc>
-                <a:spcPct val="90000"/>
-              </a:lnSpc>
-              <a:spcBef>
-                <a:spcPts val="799"/>
-              </a:spcBef>
-              <a:buClr>
-                <a:srgbClr val="1F3864"/>
-              </a:buClr>
-              <a:buFont typeface="Arial"/>
-              <a:buChar char="•"/>
-            </a:pPr>
-            <a:r>
-              <a:rPr lang="en-US" b="0" strike="noStrike" spc="-1" dirty="0">
-                <a:latin typeface="Calibri" panose="020F0502020204030204" pitchFamily="34" charset="0"/>
-                <a:cs typeface="Calibri" panose="020F0502020204030204" pitchFamily="34" charset="0"/>
-              </a:rPr>
-              <a:t>Distillation of DNN Networks into Gradient Boost tree model</a:t>
-            </a:r>
-          </a:p>
-          <a:p>
-            <a:pPr marL="914400" lvl="1" indent="-361080">
-              <a:lnSpc>
-                <a:spcPct val="90000"/>
-              </a:lnSpc>
-              <a:spcBef>
-                <a:spcPts val="799"/>
-              </a:spcBef>
-              <a:buClr>
-                <a:srgbClr val="1F3864"/>
-              </a:buClr>
-              <a:buFont typeface="Arial"/>
-              <a:buChar char="•"/>
-            </a:pPr>
-            <a:r>
-              <a:rPr lang="en-US" b="0" strike="noStrike" spc="-1" dirty="0">
-                <a:latin typeface="Calibri" panose="020F0502020204030204" pitchFamily="34" charset="0"/>
-                <a:cs typeface="Calibri" panose="020F0502020204030204" pitchFamily="34" charset="0"/>
-              </a:rPr>
-              <a:t>SANSA RDF and ML python interface</a:t>
-            </a:r>
-            <a:endParaRPr lang="en-US" spc="-1" dirty="0">
-              <a:solidFill>
-                <a:srgbClr val="000000"/>
-              </a:solidFill>
-              <a:latin typeface="Calibri" panose="020F0502020204030204" pitchFamily="34" charset="0"/>
-              <a:cs typeface="Calibri" panose="020F0502020204030204" pitchFamily="34" charset="0"/>
-            </a:endParaRPr>
-          </a:p>
-          <a:p>
-            <a:pPr marL="914400" lvl="1" indent="-361080">
-              <a:lnSpc>
-                <a:spcPct val="90000"/>
-              </a:lnSpc>
-              <a:spcBef>
-                <a:spcPts val="799"/>
-              </a:spcBef>
-              <a:buClr>
-                <a:srgbClr val="1F3864"/>
-              </a:buClr>
-              <a:buFont typeface="Arial"/>
-              <a:buChar char="•"/>
-            </a:pPr>
-            <a:endParaRPr lang="en-US" b="0" strike="noStrike" spc="-1" dirty="0">
-              <a:solidFill>
-                <a:srgbClr val="000000"/>
-              </a:solidFill>
-              <a:latin typeface="Calibri" panose="020F0502020204030204" pitchFamily="34" charset="0"/>
-              <a:cs typeface="Calibri" panose="020F0502020204030204" pitchFamily="34" charset="0"/>
-            </a:endParaRPr>
-          </a:p>
-          <a:p>
-            <a:pPr marL="914400" lvl="1" indent="-361080">
-              <a:lnSpc>
-                <a:spcPct val="90000"/>
-              </a:lnSpc>
-              <a:spcBef>
-                <a:spcPts val="799"/>
-              </a:spcBef>
-              <a:buClr>
-                <a:srgbClr val="1F3864"/>
-              </a:buClr>
-              <a:buFont typeface="Arial"/>
-              <a:buChar char="•"/>
-            </a:pPr>
-            <a:endParaRPr lang="en-US" sz="2100" b="0" strike="noStrike" spc="-1" dirty="0">
+            <a:endParaRPr lang="en-US" sz="4500" b="0" strike="noStrike" spc="-1" dirty="0">
               <a:latin typeface="Arial"/>
             </a:endParaRPr>
           </a:p>
@@ -10624,7 +10575,7 @@
     </p:spTree>
     <p:extLst>
       <p:ext uri="{BB962C8B-B14F-4D97-AF65-F5344CB8AC3E}">
-        <p14:creationId xmlns:p14="http://schemas.microsoft.com/office/powerpoint/2010/main" val="1974144199"/>
+        <p14:creationId xmlns:p14="http://schemas.microsoft.com/office/powerpoint/2010/main" val="4107614018"/>
       </p:ext>
     </p:extLst>
   </p:cSld>
@@ -10680,14 +10631,14 @@
       </p:grpSpPr>
       <p:sp>
         <p:nvSpPr>
-          <p:cNvPr id="175" name="CustomShape 1"/>
+          <p:cNvPr id="178" name="CustomShape 1"/>
           <p:cNvSpPr/>
           <p:nvPr/>
         </p:nvSpPr>
         <p:spPr>
           <a:xfrm>
-            <a:off x="422280" y="2271240"/>
-            <a:ext cx="7578360" cy="1944000"/>
+            <a:off x="628560" y="273960"/>
+            <a:ext cx="7886160" cy="575280"/>
           </a:xfrm>
           <a:prstGeom prst="rect">
             <a:avLst/>
@@ -10710,31 +10661,366 @@
           <a:fontRef idx="minor"/>
         </p:style>
         <p:txBody>
-          <a:bodyPr lIns="68400" tIns="68400" rIns="68400" bIns="68400"/>
-          <a:lstStyle/>
-          <a:p>
-            <a:pPr algn="r">
+          <a:bodyPr lIns="68400" tIns="68400" rIns="68400" bIns="68400" anchor="ctr"/>
+          <a:lstStyle/>
+          <a:p>
+            <a:pPr>
               <a:lnSpc>
                 <a:spcPct val="90000"/>
               </a:lnSpc>
             </a:pPr>
             <a:r>
-              <a:rPr lang="en-US" sz="4500" b="1" strike="noStrike" spc="-1" dirty="0">
+              <a:rPr lang="en-US" sz="3300" b="1" strike="noStrike" spc="-1" dirty="0">
                 <a:solidFill>
-                  <a:srgbClr val="FFFFFF"/>
+                  <a:srgbClr val="000000"/>
                 </a:solidFill>
                 <a:latin typeface="Calibri"/>
                 <a:ea typeface="Calibri"/>
               </a:rPr>
+              <a:t>Presentations</a:t>
+            </a:r>
+            <a:endParaRPr lang="en-US" sz="3300" b="0" strike="noStrike" spc="-1" dirty="0">
+              <a:latin typeface="Arial"/>
+            </a:endParaRPr>
+          </a:p>
+        </p:txBody>
+      </p:sp>
+      <p:sp>
+        <p:nvSpPr>
+          <p:cNvPr id="179" name="CustomShape 2"/>
+          <p:cNvSpPr/>
+          <p:nvPr/>
+        </p:nvSpPr>
+        <p:spPr>
+          <a:xfrm>
+            <a:off x="628560" y="907560"/>
+            <a:ext cx="7886160" cy="3728520"/>
+          </a:xfrm>
+          <a:prstGeom prst="rect">
+            <a:avLst/>
+          </a:prstGeom>
+          <a:noFill/>
+          <a:ln>
+            <a:noFill/>
+          </a:ln>
+        </p:spPr>
+        <p:style>
+          <a:lnRef idx="0">
+            <a:scrgbClr r="0" g="0" b="0"/>
+          </a:lnRef>
+          <a:fillRef idx="0">
+            <a:scrgbClr r="0" g="0" b="0"/>
+          </a:fillRef>
+          <a:effectRef idx="0">
+            <a:scrgbClr r="0" g="0" b="0"/>
+          </a:effectRef>
+          <a:fontRef idx="minor"/>
+        </p:style>
+        <p:txBody>
+          <a:bodyPr lIns="68400" tIns="68400" rIns="68400" bIns="68400"/>
+          <a:lstStyle/>
+          <a:p>
+            <a:pPr marL="457200" indent="-361080">
+              <a:lnSpc>
+                <a:spcPct val="90000"/>
+              </a:lnSpc>
+              <a:spcBef>
+                <a:spcPts val="799"/>
+              </a:spcBef>
+              <a:buClr>
+                <a:srgbClr val="1F3864"/>
+              </a:buClr>
+              <a:buFont typeface="Arial"/>
+              <a:buChar char="•"/>
+            </a:pPr>
+            <a:r>
+              <a:rPr lang="en-US" sz="2100" b="0" strike="noStrike" spc="-1" dirty="0">
+                <a:solidFill>
+                  <a:srgbClr val="000000"/>
+                </a:solidFill>
+                <a:latin typeface="Calibri"/>
+                <a:ea typeface="Calibri"/>
+              </a:rPr>
+              <a:t>Reminder: your presentation shouldn’t be longer than 5 minutes.</a:t>
+            </a:r>
+          </a:p>
+          <a:p>
+            <a:pPr marL="457200" indent="-361080">
+              <a:lnSpc>
+                <a:spcPct val="90000"/>
+              </a:lnSpc>
+              <a:spcBef>
+                <a:spcPts val="799"/>
+              </a:spcBef>
+              <a:buClr>
+                <a:srgbClr val="1F3864"/>
+              </a:buClr>
+              <a:buFont typeface="Arial"/>
+              <a:buChar char="•"/>
+            </a:pPr>
+            <a:r>
+              <a:rPr lang="en-US" sz="2100" spc="-1" dirty="0">
+                <a:solidFill>
+                  <a:srgbClr val="000000"/>
+                </a:solidFill>
+                <a:latin typeface="Calibri"/>
+              </a:rPr>
+              <a:t>After 10 minutes, I have to interrupt your presentation.</a:t>
+            </a:r>
+          </a:p>
+          <a:p>
+            <a:pPr marL="457200" indent="-361080">
+              <a:lnSpc>
+                <a:spcPct val="90000"/>
+              </a:lnSpc>
+              <a:spcBef>
+                <a:spcPts val="799"/>
+              </a:spcBef>
+              <a:buClr>
+                <a:srgbClr val="1F3864"/>
+              </a:buClr>
+              <a:buFont typeface="Arial"/>
+              <a:buChar char="•"/>
+            </a:pPr>
+            <a:r>
+              <a:rPr lang="en-US" sz="2100" b="0" strike="noStrike" spc="-1" dirty="0">
+                <a:solidFill>
+                  <a:srgbClr val="000000"/>
+                </a:solidFill>
+                <a:latin typeface="Calibri"/>
+              </a:rPr>
+              <a:t>We will have the pres</a:t>
+            </a:r>
+            <a:r>
+              <a:rPr lang="en-US" sz="2100" spc="-1" dirty="0">
+                <a:solidFill>
+                  <a:srgbClr val="000000"/>
+                </a:solidFill>
+                <a:latin typeface="Calibri"/>
+              </a:rPr>
+              <a:t>entations in the following order:</a:t>
+            </a:r>
+          </a:p>
+          <a:p>
+            <a:pPr marL="914400" lvl="1" indent="-361080">
+              <a:lnSpc>
+                <a:spcPct val="90000"/>
+              </a:lnSpc>
+              <a:spcBef>
+                <a:spcPts val="799"/>
+              </a:spcBef>
+              <a:buClr>
+                <a:srgbClr val="1F3864"/>
+              </a:buClr>
+              <a:buFont typeface="Arial"/>
+              <a:buChar char="•"/>
+            </a:pPr>
+            <a:r>
+              <a:rPr lang="en-US" b="0" strike="noStrike" spc="-1" dirty="0">
+                <a:latin typeface="Calibri" panose="020F0502020204030204" pitchFamily="34" charset="0"/>
+                <a:cs typeface="Calibri" panose="020F0502020204030204" pitchFamily="34" charset="0"/>
+              </a:rPr>
               <a:t>Example Based explanations of a trained ML-model for RDF and Tabular data</a:t>
             </a:r>
+            <a:endParaRPr lang="en-US" b="0" strike="noStrike" spc="-1" dirty="0">
+              <a:solidFill>
+                <a:srgbClr val="000000"/>
+              </a:solidFill>
+              <a:latin typeface="Calibri" panose="020F0502020204030204" pitchFamily="34" charset="0"/>
+              <a:cs typeface="Calibri" panose="020F0502020204030204" pitchFamily="34" charset="0"/>
+            </a:endParaRPr>
+          </a:p>
+          <a:p>
+            <a:pPr marL="914400" lvl="1" indent="-361080">
+              <a:lnSpc>
+                <a:spcPct val="90000"/>
+              </a:lnSpc>
+              <a:spcBef>
+                <a:spcPts val="799"/>
+              </a:spcBef>
+              <a:buClr>
+                <a:srgbClr val="1F3864"/>
+              </a:buClr>
+              <a:buFont typeface="Arial"/>
+              <a:buChar char="•"/>
+            </a:pPr>
+            <a:r>
+              <a:rPr lang="en-US" b="0" strike="noStrike" spc="-1" dirty="0">
+                <a:solidFill>
+                  <a:srgbClr val="000000"/>
+                </a:solidFill>
+                <a:latin typeface="Calibri" panose="020F0502020204030204" pitchFamily="34" charset="0"/>
+                <a:cs typeface="Calibri" panose="020F0502020204030204" pitchFamily="34" charset="0"/>
+              </a:rPr>
+              <a:t>Interactive Data Analytics Dashboard for RDF Knowledge Graphs</a:t>
+            </a:r>
+            <a:endParaRPr lang="en-US" b="0" strike="noStrike" spc="-1" dirty="0">
+              <a:latin typeface="Calibri" panose="020F0502020204030204" pitchFamily="34" charset="0"/>
+              <a:cs typeface="Calibri" panose="020F0502020204030204" pitchFamily="34" charset="0"/>
+            </a:endParaRPr>
+          </a:p>
+          <a:p>
+            <a:pPr marL="914400" lvl="1" indent="-361080">
+              <a:lnSpc>
+                <a:spcPct val="90000"/>
+              </a:lnSpc>
+              <a:spcBef>
+                <a:spcPts val="799"/>
+              </a:spcBef>
+              <a:buClr>
+                <a:srgbClr val="1F3864"/>
+              </a:buClr>
+              <a:buFont typeface="Arial"/>
+              <a:buChar char="•"/>
+            </a:pPr>
+            <a:r>
+              <a:rPr lang="en-US" b="0" strike="noStrike" spc="-1" dirty="0">
+                <a:latin typeface="Calibri" panose="020F0502020204030204" pitchFamily="34" charset="0"/>
+                <a:cs typeface="Calibri" panose="020F0502020204030204" pitchFamily="34" charset="0"/>
+              </a:rPr>
+              <a:t>Implement and design a machine learning hierarchy wrapper for </a:t>
+            </a:r>
+            <a:r>
+              <a:rPr lang="en-US" b="0" strike="noStrike" spc="-1" dirty="0" err="1">
+                <a:latin typeface="Calibri" panose="020F0502020204030204" pitchFamily="34" charset="0"/>
+                <a:cs typeface="Calibri" panose="020F0502020204030204" pitchFamily="34" charset="0"/>
+              </a:rPr>
+              <a:t>SimpleML</a:t>
+            </a:r>
+            <a:r>
+              <a:rPr lang="en-US" b="0" strike="noStrike" spc="-1" dirty="0">
+                <a:latin typeface="Calibri" panose="020F0502020204030204" pitchFamily="34" charset="0"/>
+                <a:cs typeface="Calibri" panose="020F0502020204030204" pitchFamily="34" charset="0"/>
+              </a:rPr>
+              <a:t> </a:t>
+            </a:r>
+          </a:p>
+          <a:p>
+            <a:pPr marL="914400" lvl="1" indent="-361080">
+              <a:lnSpc>
+                <a:spcPct val="90000"/>
+              </a:lnSpc>
+              <a:spcBef>
+                <a:spcPts val="799"/>
+              </a:spcBef>
+              <a:buClr>
+                <a:srgbClr val="1F3864"/>
+              </a:buClr>
+              <a:buFont typeface="Arial"/>
+              <a:buChar char="•"/>
+            </a:pPr>
+            <a:r>
+              <a:rPr lang="en-US" b="0" strike="noStrike" spc="-1" dirty="0">
+                <a:latin typeface="Calibri" panose="020F0502020204030204" pitchFamily="34" charset="0"/>
+                <a:cs typeface="Calibri" panose="020F0502020204030204" pitchFamily="34" charset="0"/>
+              </a:rPr>
+              <a:t>Machine learning for Entity Matching</a:t>
+            </a:r>
+            <a:endParaRPr lang="en-US" spc="-1" dirty="0">
+              <a:solidFill>
+                <a:srgbClr val="000000"/>
+              </a:solidFill>
+              <a:latin typeface="Calibri" panose="020F0502020204030204" pitchFamily="34" charset="0"/>
+              <a:cs typeface="Calibri" panose="020F0502020204030204" pitchFamily="34" charset="0"/>
+            </a:endParaRPr>
+          </a:p>
+          <a:p>
+            <a:pPr marL="914400" lvl="1" indent="-361080">
+              <a:lnSpc>
+                <a:spcPct val="90000"/>
+              </a:lnSpc>
+              <a:spcBef>
+                <a:spcPts val="799"/>
+              </a:spcBef>
+              <a:buClr>
+                <a:srgbClr val="1F3864"/>
+              </a:buClr>
+              <a:buFont typeface="Arial"/>
+              <a:buChar char="•"/>
+            </a:pPr>
+            <a:r>
+              <a:rPr lang="en-US" b="0" strike="noStrike" spc="-1" dirty="0">
+                <a:latin typeface="Calibri" panose="020F0502020204030204" pitchFamily="34" charset="0"/>
+                <a:cs typeface="Calibri" panose="020F0502020204030204" pitchFamily="34" charset="0"/>
+              </a:rPr>
+              <a:t>Distillation of DNN Networks into Gradient Boost tree model</a:t>
+            </a:r>
+          </a:p>
+          <a:p>
+            <a:pPr marL="914400" lvl="1" indent="-361080">
+              <a:lnSpc>
+                <a:spcPct val="90000"/>
+              </a:lnSpc>
+              <a:spcBef>
+                <a:spcPts val="799"/>
+              </a:spcBef>
+              <a:buClr>
+                <a:srgbClr val="1F3864"/>
+              </a:buClr>
+              <a:buFont typeface="Arial"/>
+              <a:buChar char="•"/>
+            </a:pPr>
+            <a:r>
+              <a:rPr lang="en-US" b="0" strike="noStrike" spc="-1" dirty="0">
+                <a:latin typeface="Calibri" panose="020F0502020204030204" pitchFamily="34" charset="0"/>
+                <a:cs typeface="Calibri" panose="020F0502020204030204" pitchFamily="34" charset="0"/>
+              </a:rPr>
+              <a:t>SANSA RDF and ML python interface</a:t>
+            </a:r>
+            <a:endParaRPr lang="en-US" spc="-1" dirty="0">
+              <a:solidFill>
+                <a:srgbClr val="000000"/>
+              </a:solidFill>
+              <a:latin typeface="Calibri" panose="020F0502020204030204" pitchFamily="34" charset="0"/>
+              <a:cs typeface="Calibri" panose="020F0502020204030204" pitchFamily="34" charset="0"/>
+            </a:endParaRPr>
+          </a:p>
+          <a:p>
+            <a:pPr marL="914400" lvl="1" indent="-361080">
+              <a:lnSpc>
+                <a:spcPct val="90000"/>
+              </a:lnSpc>
+              <a:spcBef>
+                <a:spcPts val="799"/>
+              </a:spcBef>
+              <a:buClr>
+                <a:srgbClr val="1F3864"/>
+              </a:buClr>
+              <a:buFont typeface="Arial"/>
+              <a:buChar char="•"/>
+            </a:pPr>
+            <a:endParaRPr lang="en-US" b="0" strike="noStrike" spc="-1" dirty="0">
+              <a:solidFill>
+                <a:srgbClr val="000000"/>
+              </a:solidFill>
+              <a:latin typeface="Calibri" panose="020F0502020204030204" pitchFamily="34" charset="0"/>
+              <a:cs typeface="Calibri" panose="020F0502020204030204" pitchFamily="34" charset="0"/>
+            </a:endParaRPr>
+          </a:p>
+          <a:p>
+            <a:pPr marL="914400" lvl="1" indent="-361080">
+              <a:lnSpc>
+                <a:spcPct val="90000"/>
+              </a:lnSpc>
+              <a:spcBef>
+                <a:spcPts val="799"/>
+              </a:spcBef>
+              <a:buClr>
+                <a:srgbClr val="1F3864"/>
+              </a:buClr>
+              <a:buFont typeface="Arial"/>
+              <a:buChar char="•"/>
+            </a:pPr>
+            <a:endParaRPr lang="en-US" sz="2100" b="0" strike="noStrike" spc="-1" dirty="0">
+              <a:latin typeface="Arial"/>
+            </a:endParaRPr>
           </a:p>
         </p:txBody>
       </p:sp>
     </p:spTree>
     <p:extLst>
       <p:ext uri="{BB962C8B-B14F-4D97-AF65-F5344CB8AC3E}">
-        <p14:creationId xmlns:p14="http://schemas.microsoft.com/office/powerpoint/2010/main" val="3804330289"/>
+        <p14:creationId xmlns:p14="http://schemas.microsoft.com/office/powerpoint/2010/main" val="1974144199"/>
       </p:ext>
     </p:extLst>
   </p:cSld>
@@ -10836,7 +11122,7 @@
                 <a:latin typeface="Calibri"/>
                 <a:ea typeface="Calibri"/>
               </a:rPr>
-              <a:t>Interactive Data Analytics Dashboard for RDF Knowledge Graphs</a:t>
+              <a:t>Example Based explanations of a trained ML-model for RDF and Tabular data</a:t>
             </a:r>
           </a:p>
         </p:txBody>
@@ -10844,7 +11130,7 @@
     </p:spTree>
     <p:extLst>
       <p:ext uri="{BB962C8B-B14F-4D97-AF65-F5344CB8AC3E}">
-        <p14:creationId xmlns:p14="http://schemas.microsoft.com/office/powerpoint/2010/main" val="3159056240"/>
+        <p14:creationId xmlns:p14="http://schemas.microsoft.com/office/powerpoint/2010/main" val="3804330289"/>
       </p:ext>
     </p:extLst>
   </p:cSld>

</xml_diff>